<commit_message>
added target to feature eng
</commit_message>
<xml_diff>
--- a/GStore User Revenue Prediction.pptx
+++ b/GStore User Revenue Prediction.pptx
@@ -4100,7 +4100,30 @@
             <a:pPr lvl="1"/>
             <a:r>
               <a:rPr lang="en-US" dirty="0"/>
-              <a:t>Created summary statistics for numeric columns (mean, median, max, min, std)</a:t>
+              <a:t>Created target revenue column ln(sum(</a:t>
+            </a:r>
+            <a:r>
+              <a:rPr lang="en-US" i="1" dirty="0"/>
+              <a:t>user revenue</a:t>
+            </a:r>
+            <a:r>
+              <a:rPr lang="en-US" dirty="0"/>
+              <a:t>)+</a:t>
+            </a:r>
+            <a:r>
+              <a:rPr lang="en-US"/>
+              <a:t>1)</a:t>
+            </a:r>
+          </a:p>
+          <a:p>
+            <a:pPr lvl="1"/>
+            <a:r>
+              <a:rPr lang="en-US"/>
+              <a:t>Created </a:t>
+            </a:r>
+            <a:r>
+              <a:rPr lang="en-US" dirty="0"/>
+              <a:t>summary statistics for numeric columns (mean, median, max, min, std)</a:t>
             </a:r>
           </a:p>
           <a:p>

</xml_diff>